<commit_message>
Added Settings for to display in Help->About form Added validation when creating new folder on the Zip Designer Tree Added About Form Fix Bug that display the folder description as "Folder" instead of "File Folder"
</commit_message>
<xml_diff>
--- a/Resources/Supporting Files/Icon Designer.pptx
+++ b/Resources/Supporting Files/Icon Designer.pptx
@@ -5,9 +5,10 @@
     <p:sldMasterId id="2147483648" r:id="rId1"/>
   </p:sldMasterIdLst>
   <p:sldIdLst>
-    <p:sldId id="257" r:id="rId2"/>
-    <p:sldId id="258" r:id="rId3"/>
-    <p:sldId id="256" r:id="rId4"/>
+    <p:sldId id="259" r:id="rId2"/>
+    <p:sldId id="257" r:id="rId3"/>
+    <p:sldId id="258" r:id="rId4"/>
+    <p:sldId id="256" r:id="rId5"/>
   </p:sldIdLst>
   <p:sldSz cx="12192000" cy="6858000"/>
   <p:notesSz cx="6858000" cy="9144000"/>
@@ -263,7 +264,7 @@
           <a:p>
             <a:fld id="{F2CC336C-A7F7-494B-ABD6-826BF81DE4AF}" type="datetimeFigureOut">
               <a:rPr lang="en-PH" smtClean="0"/>
-              <a:t>28/09/2020</a:t>
+              <a:t>02/10/2020</a:t>
             </a:fld>
             <a:endParaRPr lang="en-PH"/>
           </a:p>
@@ -463,7 +464,7 @@
           <a:p>
             <a:fld id="{F2CC336C-A7F7-494B-ABD6-826BF81DE4AF}" type="datetimeFigureOut">
               <a:rPr lang="en-PH" smtClean="0"/>
-              <a:t>28/09/2020</a:t>
+              <a:t>02/10/2020</a:t>
             </a:fld>
             <a:endParaRPr lang="en-PH"/>
           </a:p>
@@ -673,7 +674,7 @@
           <a:p>
             <a:fld id="{F2CC336C-A7F7-494B-ABD6-826BF81DE4AF}" type="datetimeFigureOut">
               <a:rPr lang="en-PH" smtClean="0"/>
-              <a:t>28/09/2020</a:t>
+              <a:t>02/10/2020</a:t>
             </a:fld>
             <a:endParaRPr lang="en-PH"/>
           </a:p>
@@ -873,7 +874,7 @@
           <a:p>
             <a:fld id="{F2CC336C-A7F7-494B-ABD6-826BF81DE4AF}" type="datetimeFigureOut">
               <a:rPr lang="en-PH" smtClean="0"/>
-              <a:t>28/09/2020</a:t>
+              <a:t>02/10/2020</a:t>
             </a:fld>
             <a:endParaRPr lang="en-PH"/>
           </a:p>
@@ -1149,7 +1150,7 @@
           <a:p>
             <a:fld id="{F2CC336C-A7F7-494B-ABD6-826BF81DE4AF}" type="datetimeFigureOut">
               <a:rPr lang="en-PH" smtClean="0"/>
-              <a:t>28/09/2020</a:t>
+              <a:t>02/10/2020</a:t>
             </a:fld>
             <a:endParaRPr lang="en-PH"/>
           </a:p>
@@ -1417,7 +1418,7 @@
           <a:p>
             <a:fld id="{F2CC336C-A7F7-494B-ABD6-826BF81DE4AF}" type="datetimeFigureOut">
               <a:rPr lang="en-PH" smtClean="0"/>
-              <a:t>28/09/2020</a:t>
+              <a:t>02/10/2020</a:t>
             </a:fld>
             <a:endParaRPr lang="en-PH"/>
           </a:p>
@@ -1832,7 +1833,7 @@
           <a:p>
             <a:fld id="{F2CC336C-A7F7-494B-ABD6-826BF81DE4AF}" type="datetimeFigureOut">
               <a:rPr lang="en-PH" smtClean="0"/>
-              <a:t>28/09/2020</a:t>
+              <a:t>02/10/2020</a:t>
             </a:fld>
             <a:endParaRPr lang="en-PH"/>
           </a:p>
@@ -1974,7 +1975,7 @@
           <a:p>
             <a:fld id="{F2CC336C-A7F7-494B-ABD6-826BF81DE4AF}" type="datetimeFigureOut">
               <a:rPr lang="en-PH" smtClean="0"/>
-              <a:t>28/09/2020</a:t>
+              <a:t>02/10/2020</a:t>
             </a:fld>
             <a:endParaRPr lang="en-PH"/>
           </a:p>
@@ -2087,7 +2088,7 @@
           <a:p>
             <a:fld id="{F2CC336C-A7F7-494B-ABD6-826BF81DE4AF}" type="datetimeFigureOut">
               <a:rPr lang="en-PH" smtClean="0"/>
-              <a:t>28/09/2020</a:t>
+              <a:t>02/10/2020</a:t>
             </a:fld>
             <a:endParaRPr lang="en-PH"/>
           </a:p>
@@ -2400,7 +2401,7 @@
           <a:p>
             <a:fld id="{F2CC336C-A7F7-494B-ABD6-826BF81DE4AF}" type="datetimeFigureOut">
               <a:rPr lang="en-PH" smtClean="0"/>
-              <a:t>28/09/2020</a:t>
+              <a:t>02/10/2020</a:t>
             </a:fld>
             <a:endParaRPr lang="en-PH"/>
           </a:p>
@@ -2689,7 +2690,7 @@
           <a:p>
             <a:fld id="{F2CC336C-A7F7-494B-ABD6-826BF81DE4AF}" type="datetimeFigureOut">
               <a:rPr lang="en-PH" smtClean="0"/>
-              <a:t>28/09/2020</a:t>
+              <a:t>02/10/2020</a:t>
             </a:fld>
             <a:endParaRPr lang="en-PH"/>
           </a:p>
@@ -2932,7 +2933,7 @@
           <a:p>
             <a:fld id="{F2CC336C-A7F7-494B-ABD6-826BF81DE4AF}" type="datetimeFigureOut">
               <a:rPr lang="en-PH" smtClean="0"/>
-              <a:t>28/09/2020</a:t>
+              <a:t>02/10/2020</a:t>
             </a:fld>
             <a:endParaRPr lang="en-PH"/>
           </a:p>
@@ -3349,6 +3350,249 @@
           <a:chExt cx="0" cy="0"/>
         </a:xfrm>
       </p:grpSpPr>
+      <p:grpSp>
+        <p:nvGrpSpPr>
+          <p:cNvPr id="26" name="Group 25">
+            <a:extLst>
+              <a:ext uri="{FF2B5EF4-FFF2-40B4-BE49-F238E27FC236}">
+                <a16:creationId xmlns:a16="http://schemas.microsoft.com/office/drawing/2014/main" id="{65A431DF-C549-45A7-8D69-587BC7A616CD}"/>
+              </a:ext>
+            </a:extLst>
+          </p:cNvPr>
+          <p:cNvGrpSpPr/>
+          <p:nvPr/>
+        </p:nvGrpSpPr>
+        <p:grpSpPr>
+          <a:xfrm>
+            <a:off x="3345735" y="1182141"/>
+            <a:ext cx="4267623" cy="3414154"/>
+            <a:chOff x="6964006" y="2529160"/>
+            <a:chExt cx="4267623" cy="3414154"/>
+          </a:xfrm>
+        </p:grpSpPr>
+        <p:pic>
+          <p:nvPicPr>
+            <p:cNvPr id="11" name="Picture 10">
+              <a:extLst>
+                <a:ext uri="{FF2B5EF4-FFF2-40B4-BE49-F238E27FC236}">
+                  <a16:creationId xmlns:a16="http://schemas.microsoft.com/office/drawing/2014/main" id="{65B8425C-9189-42AD-8129-F893076EC9A8}"/>
+                </a:ext>
+              </a:extLst>
+            </p:cNvPr>
+            <p:cNvPicPr>
+              <a:picLocks noChangeAspect="1"/>
+            </p:cNvPicPr>
+            <p:nvPr/>
+          </p:nvPicPr>
+          <p:blipFill>
+            <a:blip r:embed="rId2"/>
+            <a:stretch>
+              <a:fillRect/>
+            </a:stretch>
+          </p:blipFill>
+          <p:spPr>
+            <a:xfrm>
+              <a:off x="6964006" y="3777461"/>
+              <a:ext cx="4267623" cy="2133812"/>
+            </a:xfrm>
+            <a:prstGeom prst="rect">
+              <a:avLst/>
+            </a:prstGeom>
+          </p:spPr>
+        </p:pic>
+        <p:grpSp>
+          <p:nvGrpSpPr>
+            <p:cNvPr id="25" name="Group 24">
+              <a:extLst>
+                <a:ext uri="{FF2B5EF4-FFF2-40B4-BE49-F238E27FC236}">
+                  <a16:creationId xmlns:a16="http://schemas.microsoft.com/office/drawing/2014/main" id="{361997C7-1CF8-442D-9F20-ECCC874E771A}"/>
+                </a:ext>
+              </a:extLst>
+            </p:cNvPr>
+            <p:cNvGrpSpPr/>
+            <p:nvPr/>
+          </p:nvGrpSpPr>
+          <p:grpSpPr>
+            <a:xfrm>
+              <a:off x="8004593" y="2529160"/>
+              <a:ext cx="1925988" cy="3150918"/>
+              <a:chOff x="8004593" y="2529160"/>
+              <a:chExt cx="1925988" cy="3150918"/>
+            </a:xfrm>
+          </p:grpSpPr>
+          <p:pic>
+            <p:nvPicPr>
+              <p:cNvPr id="22" name="Picture 21">
+                <a:extLst>
+                  <a:ext uri="{FF2B5EF4-FFF2-40B4-BE49-F238E27FC236}">
+                    <a16:creationId xmlns:a16="http://schemas.microsoft.com/office/drawing/2014/main" id="{C82DC1E3-0957-4A70-AC1D-0748A03C5B1B}"/>
+                  </a:ext>
+                </a:extLst>
+              </p:cNvPr>
+              <p:cNvPicPr>
+                <a:picLocks noChangeAspect="1"/>
+              </p:cNvPicPr>
+              <p:nvPr/>
+            </p:nvPicPr>
+            <p:blipFill>
+              <a:blip r:embed="rId3">
+                <a:duotone>
+                  <a:schemeClr val="accent2">
+                    <a:shade val="45000"/>
+                    <a:satMod val="135000"/>
+                  </a:schemeClr>
+                  <a:prstClr val="white"/>
+                </a:duotone>
+                <a:extLst>
+                  <a:ext uri="{28A0092B-C50C-407E-A947-70E740481C1C}">
+                    <a14:useLocalDpi xmlns:a14="http://schemas.microsoft.com/office/drawing/2010/main" val="0"/>
+                  </a:ext>
+                </a:extLst>
+              </a:blip>
+              <a:stretch>
+                <a:fillRect/>
+              </a:stretch>
+            </p:blipFill>
+            <p:spPr>
+              <a:xfrm>
+                <a:off x="8004593" y="2529161"/>
+                <a:ext cx="1925988" cy="3150917"/>
+              </a:xfrm>
+              <a:prstGeom prst="rect">
+                <a:avLst/>
+              </a:prstGeom>
+            </p:spPr>
+          </p:pic>
+          <p:pic>
+            <p:nvPicPr>
+              <p:cNvPr id="24" name="Picture 23">
+                <a:extLst>
+                  <a:ext uri="{FF2B5EF4-FFF2-40B4-BE49-F238E27FC236}">
+                    <a16:creationId xmlns:a16="http://schemas.microsoft.com/office/drawing/2014/main" id="{E79C3814-162C-4941-A495-B0F6BAA79307}"/>
+                  </a:ext>
+                </a:extLst>
+              </p:cNvPr>
+              <p:cNvPicPr>
+                <a:picLocks noChangeAspect="1"/>
+              </p:cNvPicPr>
+              <p:nvPr/>
+            </p:nvPicPr>
+            <p:blipFill rotWithShape="1">
+              <a:blip r:embed="rId3">
+                <a:duotone>
+                  <a:schemeClr val="accent1">
+                    <a:shade val="45000"/>
+                    <a:satMod val="135000"/>
+                  </a:schemeClr>
+                  <a:prstClr val="white"/>
+                </a:duotone>
+                <a:extLst>
+                  <a:ext uri="{28A0092B-C50C-407E-A947-70E740481C1C}">
+                    <a14:useLocalDpi xmlns:a14="http://schemas.microsoft.com/office/drawing/2010/main" val="0"/>
+                  </a:ext>
+                </a:extLst>
+              </a:blip>
+              <a:srcRect l="48439"/>
+              <a:stretch/>
+            </p:blipFill>
+            <p:spPr>
+              <a:xfrm>
+                <a:off x="8937523" y="2529160"/>
+                <a:ext cx="993057" cy="3150917"/>
+              </a:xfrm>
+              <a:prstGeom prst="rect">
+                <a:avLst/>
+              </a:prstGeom>
+            </p:spPr>
+          </p:pic>
+        </p:grpSp>
+        <p:sp>
+          <p:nvSpPr>
+            <p:cNvPr id="12" name="TextBox 11">
+              <a:extLst>
+                <a:ext uri="{FF2B5EF4-FFF2-40B4-BE49-F238E27FC236}">
+                  <a16:creationId xmlns:a16="http://schemas.microsoft.com/office/drawing/2014/main" id="{FF99F7FD-345D-4D9A-8575-8FC16A0F8108}"/>
+                </a:ext>
+              </a:extLst>
+            </p:cNvPr>
+            <p:cNvSpPr txBox="1"/>
+            <p:nvPr/>
+          </p:nvSpPr>
+          <p:spPr>
+            <a:xfrm>
+              <a:off x="7195781" y="5112317"/>
+              <a:ext cx="4035848" cy="830997"/>
+            </a:xfrm>
+            <a:prstGeom prst="rect">
+              <a:avLst/>
+            </a:prstGeom>
+            <a:noFill/>
+          </p:spPr>
+          <p:txBody>
+            <a:bodyPr wrap="none" rtlCol="0">
+              <a:spAutoFit/>
+            </a:bodyPr>
+            <a:lstStyle/>
+            <a:p>
+              <a:r>
+                <a:rPr lang="en-PH" sz="4800" b="1" dirty="0">
+                  <a:ln w="9525">
+                    <a:solidFill>
+                      <a:schemeClr val="bg2">
+                        <a:lumMod val="50000"/>
+                      </a:schemeClr>
+                    </a:solidFill>
+                    <a:prstDash val="solid"/>
+                  </a:ln>
+                  <a:solidFill>
+                    <a:schemeClr val="bg1"/>
+                  </a:solidFill>
+                  <a:effectLst>
+                    <a:outerShdw blurRad="12700" dist="38100" dir="2700000" algn="tl" rotWithShape="0">
+                      <a:schemeClr val="accent5">
+                        <a:lumMod val="60000"/>
+                        <a:lumOff val="40000"/>
+                      </a:schemeClr>
+                    </a:outerShdw>
+                  </a:effectLst>
+                  <a:latin typeface="SerpentisBlack" panose="02000604020000020003" pitchFamily="2" charset="0"/>
+                </a:rPr>
+                <a:t>One Click Zip</a:t>
+              </a:r>
+            </a:p>
+          </p:txBody>
+        </p:sp>
+      </p:grpSp>
+    </p:spTree>
+    <p:extLst>
+      <p:ext uri="{BB962C8B-B14F-4D97-AF65-F5344CB8AC3E}">
+        <p14:creationId xmlns:p14="http://schemas.microsoft.com/office/powerpoint/2010/main" val="69749681"/>
+      </p:ext>
+    </p:extLst>
+  </p:cSld>
+  <p:clrMapOvr>
+    <a:masterClrMapping/>
+  </p:clrMapOvr>
+</p:sld>
+</file>
+
+<file path=ppt/slides/slide2.xml><?xml version="1.0" encoding="utf-8"?>
+<p:sld xmlns:a="http://schemas.openxmlformats.org/drawingml/2006/main" xmlns:r="http://schemas.openxmlformats.org/officeDocument/2006/relationships" xmlns:p="http://schemas.openxmlformats.org/presentationml/2006/main">
+  <p:cSld>
+    <p:spTree>
+      <p:nvGrpSpPr>
+        <p:cNvPr id="1" name=""/>
+        <p:cNvGrpSpPr/>
+        <p:nvPr/>
+      </p:nvGrpSpPr>
+      <p:grpSpPr>
+        <a:xfrm>
+          <a:off x="0" y="0"/>
+          <a:ext cx="0" cy="0"/>
+          <a:chOff x="0" y="0"/>
+          <a:chExt cx="0" cy="0"/>
+        </a:xfrm>
+      </p:grpSpPr>
       <p:pic>
         <p:nvPicPr>
           <p:cNvPr id="7" name="Graphic 6">
@@ -3477,7 +3721,7 @@
 </p:sld>
 </file>
 
-<file path=ppt/slides/slide2.xml><?xml version="1.0" encoding="utf-8"?>
+<file path=ppt/slides/slide3.xml><?xml version="1.0" encoding="utf-8"?>
 <p:sld xmlns:a="http://schemas.openxmlformats.org/drawingml/2006/main" xmlns:r="http://schemas.openxmlformats.org/officeDocument/2006/relationships" xmlns:p="http://schemas.openxmlformats.org/presentationml/2006/main">
   <p:cSld>
     <p:spTree>
@@ -3531,6 +3775,41 @@
           </a:prstGeom>
         </p:spPr>
       </p:pic>
+      <p:pic>
+        <p:nvPicPr>
+          <p:cNvPr id="2" name="Picture 1">
+            <a:extLst>
+              <a:ext uri="{FF2B5EF4-FFF2-40B4-BE49-F238E27FC236}">
+                <a16:creationId xmlns:a16="http://schemas.microsoft.com/office/drawing/2014/main" id="{5D4C1A1D-42F6-47AC-AED4-2777E7633445}"/>
+              </a:ext>
+            </a:extLst>
+          </p:cNvPr>
+          <p:cNvPicPr>
+            <a:picLocks noChangeAspect="1"/>
+          </p:cNvPicPr>
+          <p:nvPr/>
+        </p:nvPicPr>
+        <p:blipFill rotWithShape="1">
+          <a:blip r:embed="rId3">
+            <a:extLst>
+              <a:ext uri="{28A0092B-C50C-407E-A947-70E740481C1C}">
+                <a14:useLocalDpi xmlns:a14="http://schemas.microsoft.com/office/drawing/2010/main" val="0"/>
+              </a:ext>
+            </a:extLst>
+          </a:blip>
+          <a:srcRect l="17406" t="25051" r="5445" b="18115"/>
+          <a:stretch/>
+        </p:blipFill>
+        <p:spPr>
+          <a:xfrm>
+            <a:off x="1089891" y="1274757"/>
+            <a:ext cx="2382982" cy="3897745"/>
+          </a:xfrm>
+          <a:prstGeom prst="rect">
+            <a:avLst/>
+          </a:prstGeom>
+        </p:spPr>
+      </p:pic>
     </p:spTree>
     <p:extLst>
       <p:ext uri="{BB962C8B-B14F-4D97-AF65-F5344CB8AC3E}">
@@ -3544,7 +3823,7 @@
 </p:sld>
 </file>
 
-<file path=ppt/slides/slide3.xml><?xml version="1.0" encoding="utf-8"?>
+<file path=ppt/slides/slide4.xml><?xml version="1.0" encoding="utf-8"?>
 <p:sld xmlns:a="http://schemas.openxmlformats.org/drawingml/2006/main" xmlns:r="http://schemas.openxmlformats.org/officeDocument/2006/relationships" xmlns:p="http://schemas.openxmlformats.org/presentationml/2006/main">
   <p:cSld>
     <p:spTree>

</xml_diff>

<commit_message>
Added nuget dazinator/DotNet.Glob. Implement Filtering rule except empty folder rule. Add validation on GUI. Add GUI controls for Filtering rule. Fix bugs on adding file and folder in Tree Node format Added some icons for the buttons
</commit_message>
<xml_diff>
--- a/Resources/Supporting Files/Icon Designer.pptx
+++ b/Resources/Supporting Files/Icon Designer.pptx
@@ -264,7 +264,7 @@
           <a:p>
             <a:fld id="{F2CC336C-A7F7-494B-ABD6-826BF81DE4AF}" type="datetimeFigureOut">
               <a:rPr lang="en-PH" smtClean="0"/>
-              <a:t>02/10/2020</a:t>
+              <a:t>06/10/2020</a:t>
             </a:fld>
             <a:endParaRPr lang="en-PH"/>
           </a:p>
@@ -464,7 +464,7 @@
           <a:p>
             <a:fld id="{F2CC336C-A7F7-494B-ABD6-826BF81DE4AF}" type="datetimeFigureOut">
               <a:rPr lang="en-PH" smtClean="0"/>
-              <a:t>02/10/2020</a:t>
+              <a:t>06/10/2020</a:t>
             </a:fld>
             <a:endParaRPr lang="en-PH"/>
           </a:p>
@@ -674,7 +674,7 @@
           <a:p>
             <a:fld id="{F2CC336C-A7F7-494B-ABD6-826BF81DE4AF}" type="datetimeFigureOut">
               <a:rPr lang="en-PH" smtClean="0"/>
-              <a:t>02/10/2020</a:t>
+              <a:t>06/10/2020</a:t>
             </a:fld>
             <a:endParaRPr lang="en-PH"/>
           </a:p>
@@ -874,7 +874,7 @@
           <a:p>
             <a:fld id="{F2CC336C-A7F7-494B-ABD6-826BF81DE4AF}" type="datetimeFigureOut">
               <a:rPr lang="en-PH" smtClean="0"/>
-              <a:t>02/10/2020</a:t>
+              <a:t>06/10/2020</a:t>
             </a:fld>
             <a:endParaRPr lang="en-PH"/>
           </a:p>
@@ -1150,7 +1150,7 @@
           <a:p>
             <a:fld id="{F2CC336C-A7F7-494B-ABD6-826BF81DE4AF}" type="datetimeFigureOut">
               <a:rPr lang="en-PH" smtClean="0"/>
-              <a:t>02/10/2020</a:t>
+              <a:t>06/10/2020</a:t>
             </a:fld>
             <a:endParaRPr lang="en-PH"/>
           </a:p>
@@ -1418,7 +1418,7 @@
           <a:p>
             <a:fld id="{F2CC336C-A7F7-494B-ABD6-826BF81DE4AF}" type="datetimeFigureOut">
               <a:rPr lang="en-PH" smtClean="0"/>
-              <a:t>02/10/2020</a:t>
+              <a:t>06/10/2020</a:t>
             </a:fld>
             <a:endParaRPr lang="en-PH"/>
           </a:p>
@@ -1833,7 +1833,7 @@
           <a:p>
             <a:fld id="{F2CC336C-A7F7-494B-ABD6-826BF81DE4AF}" type="datetimeFigureOut">
               <a:rPr lang="en-PH" smtClean="0"/>
-              <a:t>02/10/2020</a:t>
+              <a:t>06/10/2020</a:t>
             </a:fld>
             <a:endParaRPr lang="en-PH"/>
           </a:p>
@@ -1975,7 +1975,7 @@
           <a:p>
             <a:fld id="{F2CC336C-A7F7-494B-ABD6-826BF81DE4AF}" type="datetimeFigureOut">
               <a:rPr lang="en-PH" smtClean="0"/>
-              <a:t>02/10/2020</a:t>
+              <a:t>06/10/2020</a:t>
             </a:fld>
             <a:endParaRPr lang="en-PH"/>
           </a:p>
@@ -2088,7 +2088,7 @@
           <a:p>
             <a:fld id="{F2CC336C-A7F7-494B-ABD6-826BF81DE4AF}" type="datetimeFigureOut">
               <a:rPr lang="en-PH" smtClean="0"/>
-              <a:t>02/10/2020</a:t>
+              <a:t>06/10/2020</a:t>
             </a:fld>
             <a:endParaRPr lang="en-PH"/>
           </a:p>
@@ -2401,7 +2401,7 @@
           <a:p>
             <a:fld id="{F2CC336C-A7F7-494B-ABD6-826BF81DE4AF}" type="datetimeFigureOut">
               <a:rPr lang="en-PH" smtClean="0"/>
-              <a:t>02/10/2020</a:t>
+              <a:t>06/10/2020</a:t>
             </a:fld>
             <a:endParaRPr lang="en-PH"/>
           </a:p>
@@ -2690,7 +2690,7 @@
           <a:p>
             <a:fld id="{F2CC336C-A7F7-494B-ABD6-826BF81DE4AF}" type="datetimeFigureOut">
               <a:rPr lang="en-PH" smtClean="0"/>
-              <a:t>02/10/2020</a:t>
+              <a:t>06/10/2020</a:t>
             </a:fld>
             <a:endParaRPr lang="en-PH"/>
           </a:p>
@@ -2933,7 +2933,7 @@
           <a:p>
             <a:fld id="{F2CC336C-A7F7-494B-ABD6-826BF81DE4AF}" type="datetimeFigureOut">
               <a:rPr lang="en-PH" smtClean="0"/>
-              <a:t>02/10/2020</a:t>
+              <a:t>06/10/2020</a:t>
             </a:fld>
             <a:endParaRPr lang="en-PH"/>
           </a:p>
@@ -3352,10 +3352,10 @@
       </p:grpSpPr>
       <p:grpSp>
         <p:nvGrpSpPr>
-          <p:cNvPr id="26" name="Group 25">
-            <a:extLst>
-              <a:ext uri="{FF2B5EF4-FFF2-40B4-BE49-F238E27FC236}">
-                <a16:creationId xmlns:a16="http://schemas.microsoft.com/office/drawing/2014/main" id="{65A431DF-C549-45A7-8D69-587BC7A616CD}"/>
+          <p:cNvPr id="4" name="Group 3">
+            <a:extLst>
+              <a:ext uri="{FF2B5EF4-FFF2-40B4-BE49-F238E27FC236}">
+                <a16:creationId xmlns:a16="http://schemas.microsoft.com/office/drawing/2014/main" id="{84ABC81C-8715-497D-855B-C033ACD6D1F2}"/>
               </a:ext>
             </a:extLst>
           </p:cNvPr>
@@ -3364,18 +3364,18 @@
         </p:nvGrpSpPr>
         <p:grpSpPr>
           <a:xfrm>
-            <a:off x="3345735" y="1182141"/>
-            <a:ext cx="4267623" cy="3414154"/>
-            <a:chOff x="6964006" y="2529160"/>
-            <a:chExt cx="4267623" cy="3414154"/>
+            <a:off x="1359917" y="794342"/>
+            <a:ext cx="4267623" cy="3645350"/>
+            <a:chOff x="7372790" y="997542"/>
+            <a:chExt cx="4267623" cy="3645350"/>
           </a:xfrm>
         </p:grpSpPr>
         <p:pic>
           <p:nvPicPr>
-            <p:cNvPr id="11" name="Picture 10">
+            <p:cNvPr id="3" name="Picture 2">
               <a:extLst>
                 <a:ext uri="{FF2B5EF4-FFF2-40B4-BE49-F238E27FC236}">
-                  <a16:creationId xmlns:a16="http://schemas.microsoft.com/office/drawing/2014/main" id="{65B8425C-9189-42AD-8129-F893076EC9A8}"/>
+                  <a16:creationId xmlns:a16="http://schemas.microsoft.com/office/drawing/2014/main" id="{9294907D-4760-441C-BBC3-F6671A7239EE}"/>
                 </a:ext>
               </a:extLst>
             </p:cNvPr>
@@ -3384,28 +3384,48 @@
             </p:cNvPicPr>
             <p:nvPr/>
           </p:nvPicPr>
-          <p:blipFill>
-            <a:blip r:embed="rId2"/>
-            <a:stretch>
-              <a:fillRect/>
-            </a:stretch>
+          <p:blipFill rotWithShape="1">
+            <a:blip r:embed="rId2">
+              <a:extLst>
+                <a:ext uri="{BEBA8EAE-BF5A-486C-A8C5-ECC9F3942E4B}">
+                  <a14:imgProps xmlns:a14="http://schemas.microsoft.com/office/drawing/2010/main">
+                    <a14:imgLayer r:embed="rId3">
+                      <a14:imgEffect>
+                        <a14:brightnessContrast contrast="40000"/>
+                      </a14:imgEffect>
+                    </a14:imgLayer>
+                  </a14:imgProps>
+                </a:ext>
+                <a:ext uri="{28A0092B-C50C-407E-A947-70E740481C1C}">
+                  <a14:useLocalDpi xmlns:a14="http://schemas.microsoft.com/office/drawing/2010/main" val="0"/>
+                </a:ext>
+              </a:extLst>
+            </a:blip>
+            <a:srcRect l="8049" t="51822" r="56948"/>
+            <a:stretch/>
           </p:blipFill>
           <p:spPr>
             <a:xfrm>
-              <a:off x="6964006" y="3777461"/>
-              <a:ext cx="4267623" cy="2133812"/>
+              <a:off x="7372790" y="997542"/>
+              <a:ext cx="4267623" cy="2646315"/>
             </a:xfrm>
             <a:prstGeom prst="rect">
               <a:avLst/>
             </a:prstGeom>
+            <a:ln>
+              <a:noFill/>
+            </a:ln>
+            <a:effectLst>
+              <a:softEdge rad="31750"/>
+            </a:effectLst>
           </p:spPr>
         </p:pic>
         <p:grpSp>
           <p:nvGrpSpPr>
-            <p:cNvPr id="25" name="Group 24">
+            <p:cNvPr id="26" name="Group 25">
               <a:extLst>
                 <a:ext uri="{FF2B5EF4-FFF2-40B4-BE49-F238E27FC236}">
-                  <a16:creationId xmlns:a16="http://schemas.microsoft.com/office/drawing/2014/main" id="{361997C7-1CF8-442D-9F20-ECCC874E771A}"/>
+                  <a16:creationId xmlns:a16="http://schemas.microsoft.com/office/drawing/2014/main" id="{65A431DF-C549-45A7-8D69-587BC7A616CD}"/>
                 </a:ext>
               </a:extLst>
             </p:cNvPr>
@@ -3414,18 +3434,18 @@
           </p:nvGrpSpPr>
           <p:grpSpPr>
             <a:xfrm>
-              <a:off x="8004593" y="2529160"/>
-              <a:ext cx="1925988" cy="3150918"/>
-              <a:chOff x="8004593" y="2529160"/>
-              <a:chExt cx="1925988" cy="3150918"/>
+              <a:off x="7372790" y="1228738"/>
+              <a:ext cx="4267623" cy="3414154"/>
+              <a:chOff x="6964006" y="2529160"/>
+              <a:chExt cx="4267623" cy="3414154"/>
             </a:xfrm>
           </p:grpSpPr>
           <p:pic>
             <p:nvPicPr>
-              <p:cNvPr id="22" name="Picture 21">
+              <p:cNvPr id="11" name="Picture 10">
                 <a:extLst>
                   <a:ext uri="{FF2B5EF4-FFF2-40B4-BE49-F238E27FC236}">
-                    <a16:creationId xmlns:a16="http://schemas.microsoft.com/office/drawing/2014/main" id="{C82DC1E3-0957-4A70-AC1D-0748A03C5B1B}"/>
+                    <a16:creationId xmlns:a16="http://schemas.microsoft.com/office/drawing/2014/main" id="{65B8425C-9189-42AD-8129-F893076EC9A8}"/>
                   </a:ext>
                 </a:extLst>
               </p:cNvPr>
@@ -3435,133 +3455,184 @@
               <p:nvPr/>
             </p:nvPicPr>
             <p:blipFill>
-              <a:blip r:embed="rId3">
-                <a:duotone>
-                  <a:schemeClr val="accent2">
-                    <a:shade val="45000"/>
-                    <a:satMod val="135000"/>
-                  </a:schemeClr>
-                  <a:prstClr val="white"/>
-                </a:duotone>
-                <a:extLst>
-                  <a:ext uri="{28A0092B-C50C-407E-A947-70E740481C1C}">
-                    <a14:useLocalDpi xmlns:a14="http://schemas.microsoft.com/office/drawing/2010/main" val="0"/>
-                  </a:ext>
-                </a:extLst>
-              </a:blip>
+              <a:blip r:embed="rId4"/>
               <a:stretch>
                 <a:fillRect/>
               </a:stretch>
             </p:blipFill>
             <p:spPr>
               <a:xfrm>
-                <a:off x="8004593" y="2529161"/>
-                <a:ext cx="1925988" cy="3150917"/>
+                <a:off x="6964006" y="3777461"/>
+                <a:ext cx="4267623" cy="2133812"/>
               </a:xfrm>
               <a:prstGeom prst="rect">
                 <a:avLst/>
               </a:prstGeom>
             </p:spPr>
           </p:pic>
-          <p:pic>
-            <p:nvPicPr>
-              <p:cNvPr id="24" name="Picture 23">
+          <p:grpSp>
+            <p:nvGrpSpPr>
+              <p:cNvPr id="25" name="Group 24">
                 <a:extLst>
                   <a:ext uri="{FF2B5EF4-FFF2-40B4-BE49-F238E27FC236}">
-                    <a16:creationId xmlns:a16="http://schemas.microsoft.com/office/drawing/2014/main" id="{E79C3814-162C-4941-A495-B0F6BAA79307}"/>
+                    <a16:creationId xmlns:a16="http://schemas.microsoft.com/office/drawing/2014/main" id="{361997C7-1CF8-442D-9F20-ECCC874E771A}"/>
                   </a:ext>
                 </a:extLst>
               </p:cNvPr>
-              <p:cNvPicPr>
-                <a:picLocks noChangeAspect="1"/>
-              </p:cNvPicPr>
+              <p:cNvGrpSpPr/>
               <p:nvPr/>
-            </p:nvPicPr>
-            <p:blipFill rotWithShape="1">
-              <a:blip r:embed="rId3">
-                <a:duotone>
-                  <a:schemeClr val="accent1">
-                    <a:shade val="45000"/>
-                    <a:satMod val="135000"/>
-                  </a:schemeClr>
-                  <a:prstClr val="white"/>
-                </a:duotone>
+            </p:nvGrpSpPr>
+            <p:grpSpPr>
+              <a:xfrm>
+                <a:off x="8004593" y="2529160"/>
+                <a:ext cx="1925988" cy="3150918"/>
+                <a:chOff x="8004593" y="2529160"/>
+                <a:chExt cx="1925988" cy="3150918"/>
+              </a:xfrm>
+            </p:grpSpPr>
+            <p:pic>
+              <p:nvPicPr>
+                <p:cNvPr id="22" name="Picture 21">
+                  <a:extLst>
+                    <a:ext uri="{FF2B5EF4-FFF2-40B4-BE49-F238E27FC236}">
+                      <a16:creationId xmlns:a16="http://schemas.microsoft.com/office/drawing/2014/main" id="{C82DC1E3-0957-4A70-AC1D-0748A03C5B1B}"/>
+                    </a:ext>
+                  </a:extLst>
+                </p:cNvPr>
+                <p:cNvPicPr>
+                  <a:picLocks noChangeAspect="1"/>
+                </p:cNvPicPr>
+                <p:nvPr/>
+              </p:nvPicPr>
+              <p:blipFill>
+                <a:blip r:embed="rId5">
+                  <a:duotone>
+                    <a:schemeClr val="accent2">
+                      <a:shade val="45000"/>
+                      <a:satMod val="135000"/>
+                    </a:schemeClr>
+                    <a:prstClr val="white"/>
+                  </a:duotone>
+                  <a:extLst>
+                    <a:ext uri="{28A0092B-C50C-407E-A947-70E740481C1C}">
+                      <a14:useLocalDpi xmlns:a14="http://schemas.microsoft.com/office/drawing/2010/main" val="0"/>
+                    </a:ext>
+                  </a:extLst>
+                </a:blip>
+                <a:stretch>
+                  <a:fillRect/>
+                </a:stretch>
+              </p:blipFill>
+              <p:spPr>
+                <a:xfrm>
+                  <a:off x="8004593" y="2529161"/>
+                  <a:ext cx="1925988" cy="3150917"/>
+                </a:xfrm>
+                <a:prstGeom prst="rect">
+                  <a:avLst/>
+                </a:prstGeom>
+              </p:spPr>
+            </p:pic>
+            <p:pic>
+              <p:nvPicPr>
+                <p:cNvPr id="24" name="Picture 23">
+                  <a:extLst>
+                    <a:ext uri="{FF2B5EF4-FFF2-40B4-BE49-F238E27FC236}">
+                      <a16:creationId xmlns:a16="http://schemas.microsoft.com/office/drawing/2014/main" id="{E79C3814-162C-4941-A495-B0F6BAA79307}"/>
+                    </a:ext>
+                  </a:extLst>
+                </p:cNvPr>
+                <p:cNvPicPr>
+                  <a:picLocks noChangeAspect="1"/>
+                </p:cNvPicPr>
+                <p:nvPr/>
+              </p:nvPicPr>
+              <p:blipFill rotWithShape="1">
+                <a:blip r:embed="rId5">
+                  <a:duotone>
+                    <a:schemeClr val="accent1">
+                      <a:shade val="45000"/>
+                      <a:satMod val="135000"/>
+                    </a:schemeClr>
+                    <a:prstClr val="white"/>
+                  </a:duotone>
+                  <a:extLst>
+                    <a:ext uri="{28A0092B-C50C-407E-A947-70E740481C1C}">
+                      <a14:useLocalDpi xmlns:a14="http://schemas.microsoft.com/office/drawing/2010/main" val="0"/>
+                    </a:ext>
+                  </a:extLst>
+                </a:blip>
+                <a:srcRect l="48439"/>
+                <a:stretch/>
+              </p:blipFill>
+              <p:spPr>
+                <a:xfrm>
+                  <a:off x="8937523" y="2529160"/>
+                  <a:ext cx="993057" cy="3150917"/>
+                </a:xfrm>
+                <a:prstGeom prst="rect">
+                  <a:avLst/>
+                </a:prstGeom>
+              </p:spPr>
+            </p:pic>
+          </p:grpSp>
+          <p:sp>
+            <p:nvSpPr>
+              <p:cNvPr id="12" name="TextBox 11">
                 <a:extLst>
-                  <a:ext uri="{28A0092B-C50C-407E-A947-70E740481C1C}">
-                    <a14:useLocalDpi xmlns:a14="http://schemas.microsoft.com/office/drawing/2010/main" val="0"/>
+                  <a:ext uri="{FF2B5EF4-FFF2-40B4-BE49-F238E27FC236}">
+                    <a16:creationId xmlns:a16="http://schemas.microsoft.com/office/drawing/2014/main" id="{FF99F7FD-345D-4D9A-8575-8FC16A0F8108}"/>
                   </a:ext>
                 </a:extLst>
-              </a:blip>
-              <a:srcRect l="48439"/>
-              <a:stretch/>
-            </p:blipFill>
+              </p:cNvPr>
+              <p:cNvSpPr txBox="1"/>
+              <p:nvPr/>
+            </p:nvSpPr>
             <p:spPr>
               <a:xfrm>
-                <a:off x="8937523" y="2529160"/>
-                <a:ext cx="993057" cy="3150917"/>
+                <a:off x="7195781" y="5112317"/>
+                <a:ext cx="4035848" cy="830997"/>
               </a:xfrm>
               <a:prstGeom prst="rect">
                 <a:avLst/>
               </a:prstGeom>
+              <a:noFill/>
             </p:spPr>
-          </p:pic>
+            <p:txBody>
+              <a:bodyPr wrap="none" rtlCol="0">
+                <a:spAutoFit/>
+              </a:bodyPr>
+              <a:lstStyle/>
+              <a:p>
+                <a:r>
+                  <a:rPr lang="en-PH" sz="4800" b="1" dirty="0">
+                    <a:ln w="9525">
+                      <a:solidFill>
+                        <a:schemeClr val="bg2">
+                          <a:lumMod val="50000"/>
+                        </a:schemeClr>
+                      </a:solidFill>
+                      <a:prstDash val="solid"/>
+                    </a:ln>
+                    <a:solidFill>
+                      <a:schemeClr val="bg1"/>
+                    </a:solidFill>
+                    <a:effectLst>
+                      <a:outerShdw blurRad="12700" dist="38100" dir="2700000" algn="tl" rotWithShape="0">
+                        <a:schemeClr val="accent5">
+                          <a:lumMod val="60000"/>
+                          <a:lumOff val="40000"/>
+                        </a:schemeClr>
+                      </a:outerShdw>
+                    </a:effectLst>
+                    <a:latin typeface="SerpentisBlack" panose="02000604020000020003" pitchFamily="2" charset="0"/>
+                  </a:rPr>
+                  <a:t>One Click Zip</a:t>
+                </a:r>
+              </a:p>
+            </p:txBody>
+          </p:sp>
         </p:grpSp>
-        <p:sp>
-          <p:nvSpPr>
-            <p:cNvPr id="12" name="TextBox 11">
-              <a:extLst>
-                <a:ext uri="{FF2B5EF4-FFF2-40B4-BE49-F238E27FC236}">
-                  <a16:creationId xmlns:a16="http://schemas.microsoft.com/office/drawing/2014/main" id="{FF99F7FD-345D-4D9A-8575-8FC16A0F8108}"/>
-                </a:ext>
-              </a:extLst>
-            </p:cNvPr>
-            <p:cNvSpPr txBox="1"/>
-            <p:nvPr/>
-          </p:nvSpPr>
-          <p:spPr>
-            <a:xfrm>
-              <a:off x="7195781" y="5112317"/>
-              <a:ext cx="4035848" cy="830997"/>
-            </a:xfrm>
-            <a:prstGeom prst="rect">
-              <a:avLst/>
-            </a:prstGeom>
-            <a:noFill/>
-          </p:spPr>
-          <p:txBody>
-            <a:bodyPr wrap="none" rtlCol="0">
-              <a:spAutoFit/>
-            </a:bodyPr>
-            <a:lstStyle/>
-            <a:p>
-              <a:r>
-                <a:rPr lang="en-PH" sz="4800" b="1" dirty="0">
-                  <a:ln w="9525">
-                    <a:solidFill>
-                      <a:schemeClr val="bg2">
-                        <a:lumMod val="50000"/>
-                      </a:schemeClr>
-                    </a:solidFill>
-                    <a:prstDash val="solid"/>
-                  </a:ln>
-                  <a:solidFill>
-                    <a:schemeClr val="bg1"/>
-                  </a:solidFill>
-                  <a:effectLst>
-                    <a:outerShdw blurRad="12700" dist="38100" dir="2700000" algn="tl" rotWithShape="0">
-                      <a:schemeClr val="accent5">
-                        <a:lumMod val="60000"/>
-                        <a:lumOff val="40000"/>
-                      </a:schemeClr>
-                    </a:outerShdw>
-                  </a:effectLst>
-                  <a:latin typeface="SerpentisBlack" panose="02000604020000020003" pitchFamily="2" charset="0"/>
-                </a:rPr>
-                <a:t>One Click Zip</a:t>
-              </a:r>
-            </a:p>
-          </p:txBody>
-        </p:sp>
       </p:grpSp>
     </p:spTree>
     <p:extLst>

</xml_diff>

<commit_message>
Added new icons for the forms File Name Designer form has been UI revamp a little Added icons on the buttons Change the button icons on tree view and on its partnered list view to tool strip bar which is more easy to use and UI friendly Added fix on the bug when running the zip archving Added exclusive Icon for folder filter rule Add new context menu on tree view add new context menu on File Name Designer List View
</commit_message>
<xml_diff>
--- a/Resources/Supporting Files/Icon Designer.pptx
+++ b/Resources/Supporting Files/Icon Designer.pptx
@@ -5,10 +5,12 @@
     <p:sldMasterId id="2147483648" r:id="rId1"/>
   </p:sldMasterIdLst>
   <p:sldIdLst>
-    <p:sldId id="259" r:id="rId2"/>
-    <p:sldId id="257" r:id="rId3"/>
-    <p:sldId id="258" r:id="rId4"/>
-    <p:sldId id="256" r:id="rId5"/>
+    <p:sldId id="261" r:id="rId2"/>
+    <p:sldId id="260" r:id="rId3"/>
+    <p:sldId id="259" r:id="rId4"/>
+    <p:sldId id="257" r:id="rId5"/>
+    <p:sldId id="258" r:id="rId6"/>
+    <p:sldId id="256" r:id="rId7"/>
   </p:sldIdLst>
   <p:sldSz cx="12192000" cy="6858000"/>
   <p:notesSz cx="6858000" cy="9144000"/>
@@ -264,7 +266,7 @@
           <a:p>
             <a:fld id="{F2CC336C-A7F7-494B-ABD6-826BF81DE4AF}" type="datetimeFigureOut">
               <a:rPr lang="en-PH" smtClean="0"/>
-              <a:t>06/10/2020</a:t>
+              <a:t>15/10/2020</a:t>
             </a:fld>
             <a:endParaRPr lang="en-PH"/>
           </a:p>
@@ -464,7 +466,7 @@
           <a:p>
             <a:fld id="{F2CC336C-A7F7-494B-ABD6-826BF81DE4AF}" type="datetimeFigureOut">
               <a:rPr lang="en-PH" smtClean="0"/>
-              <a:t>06/10/2020</a:t>
+              <a:t>15/10/2020</a:t>
             </a:fld>
             <a:endParaRPr lang="en-PH"/>
           </a:p>
@@ -674,7 +676,7 @@
           <a:p>
             <a:fld id="{F2CC336C-A7F7-494B-ABD6-826BF81DE4AF}" type="datetimeFigureOut">
               <a:rPr lang="en-PH" smtClean="0"/>
-              <a:t>06/10/2020</a:t>
+              <a:t>15/10/2020</a:t>
             </a:fld>
             <a:endParaRPr lang="en-PH"/>
           </a:p>
@@ -874,7 +876,7 @@
           <a:p>
             <a:fld id="{F2CC336C-A7F7-494B-ABD6-826BF81DE4AF}" type="datetimeFigureOut">
               <a:rPr lang="en-PH" smtClean="0"/>
-              <a:t>06/10/2020</a:t>
+              <a:t>15/10/2020</a:t>
             </a:fld>
             <a:endParaRPr lang="en-PH"/>
           </a:p>
@@ -1150,7 +1152,7 @@
           <a:p>
             <a:fld id="{F2CC336C-A7F7-494B-ABD6-826BF81DE4AF}" type="datetimeFigureOut">
               <a:rPr lang="en-PH" smtClean="0"/>
-              <a:t>06/10/2020</a:t>
+              <a:t>15/10/2020</a:t>
             </a:fld>
             <a:endParaRPr lang="en-PH"/>
           </a:p>
@@ -1418,7 +1420,7 @@
           <a:p>
             <a:fld id="{F2CC336C-A7F7-494B-ABD6-826BF81DE4AF}" type="datetimeFigureOut">
               <a:rPr lang="en-PH" smtClean="0"/>
-              <a:t>06/10/2020</a:t>
+              <a:t>15/10/2020</a:t>
             </a:fld>
             <a:endParaRPr lang="en-PH"/>
           </a:p>
@@ -1833,7 +1835,7 @@
           <a:p>
             <a:fld id="{F2CC336C-A7F7-494B-ABD6-826BF81DE4AF}" type="datetimeFigureOut">
               <a:rPr lang="en-PH" smtClean="0"/>
-              <a:t>06/10/2020</a:t>
+              <a:t>15/10/2020</a:t>
             </a:fld>
             <a:endParaRPr lang="en-PH"/>
           </a:p>
@@ -1975,7 +1977,7 @@
           <a:p>
             <a:fld id="{F2CC336C-A7F7-494B-ABD6-826BF81DE4AF}" type="datetimeFigureOut">
               <a:rPr lang="en-PH" smtClean="0"/>
-              <a:t>06/10/2020</a:t>
+              <a:t>15/10/2020</a:t>
             </a:fld>
             <a:endParaRPr lang="en-PH"/>
           </a:p>
@@ -2088,7 +2090,7 @@
           <a:p>
             <a:fld id="{F2CC336C-A7F7-494B-ABD6-826BF81DE4AF}" type="datetimeFigureOut">
               <a:rPr lang="en-PH" smtClean="0"/>
-              <a:t>06/10/2020</a:t>
+              <a:t>15/10/2020</a:t>
             </a:fld>
             <a:endParaRPr lang="en-PH"/>
           </a:p>
@@ -2401,7 +2403,7 @@
           <a:p>
             <a:fld id="{F2CC336C-A7F7-494B-ABD6-826BF81DE4AF}" type="datetimeFigureOut">
               <a:rPr lang="en-PH" smtClean="0"/>
-              <a:t>06/10/2020</a:t>
+              <a:t>15/10/2020</a:t>
             </a:fld>
             <a:endParaRPr lang="en-PH"/>
           </a:p>
@@ -2690,7 +2692,7 @@
           <a:p>
             <a:fld id="{F2CC336C-A7F7-494B-ABD6-826BF81DE4AF}" type="datetimeFigureOut">
               <a:rPr lang="en-PH" smtClean="0"/>
-              <a:t>06/10/2020</a:t>
+              <a:t>15/10/2020</a:t>
             </a:fld>
             <a:endParaRPr lang="en-PH"/>
           </a:p>
@@ -2933,7 +2935,7 @@
           <a:p>
             <a:fld id="{F2CC336C-A7F7-494B-ABD6-826BF81DE4AF}" type="datetimeFigureOut">
               <a:rPr lang="en-PH" smtClean="0"/>
-              <a:t>06/10/2020</a:t>
+              <a:t>15/10/2020</a:t>
             </a:fld>
             <a:endParaRPr lang="en-PH"/>
           </a:p>
@@ -3350,6 +3352,482 @@
           <a:chExt cx="0" cy="0"/>
         </a:xfrm>
       </p:grpSpPr>
+      <p:pic>
+        <p:nvPicPr>
+          <p:cNvPr id="5" name="Picture 4">
+            <a:extLst>
+              <a:ext uri="{FF2B5EF4-FFF2-40B4-BE49-F238E27FC236}">
+                <a16:creationId xmlns:a16="http://schemas.microsoft.com/office/drawing/2014/main" id="{173B13AE-7EEB-46AF-8F20-1C9C3604F174}"/>
+              </a:ext>
+            </a:extLst>
+          </p:cNvPr>
+          <p:cNvPicPr>
+            <a:picLocks noChangeAspect="1"/>
+          </p:cNvPicPr>
+          <p:nvPr/>
+        </p:nvPicPr>
+        <p:blipFill>
+          <a:blip r:embed="rId2">
+            <a:extLst>
+              <a:ext uri="{28A0092B-C50C-407E-A947-70E740481C1C}">
+                <a14:useLocalDpi xmlns:a14="http://schemas.microsoft.com/office/drawing/2010/main" val="0"/>
+              </a:ext>
+            </a:extLst>
+          </a:blip>
+          <a:stretch>
+            <a:fillRect/>
+          </a:stretch>
+        </p:blipFill>
+        <p:spPr>
+          <a:xfrm>
+            <a:off x="5918291" y="3242055"/>
+            <a:ext cx="780290" cy="780290"/>
+          </a:xfrm>
+          <a:prstGeom prst="rect">
+            <a:avLst/>
+          </a:prstGeom>
+        </p:spPr>
+      </p:pic>
+      <p:pic>
+        <p:nvPicPr>
+          <p:cNvPr id="3" name="Picture 2">
+            <a:extLst>
+              <a:ext uri="{FF2B5EF4-FFF2-40B4-BE49-F238E27FC236}">
+                <a16:creationId xmlns:a16="http://schemas.microsoft.com/office/drawing/2014/main" id="{CC3A319B-20F1-4743-8BF2-C4C5C7246C09}"/>
+              </a:ext>
+            </a:extLst>
+          </p:cNvPr>
+          <p:cNvPicPr>
+            <a:picLocks noChangeAspect="1"/>
+          </p:cNvPicPr>
+          <p:nvPr/>
+        </p:nvPicPr>
+        <p:blipFill>
+          <a:blip r:embed="rId3">
+            <a:extLst>
+              <a:ext uri="{28A0092B-C50C-407E-A947-70E740481C1C}">
+                <a14:useLocalDpi xmlns:a14="http://schemas.microsoft.com/office/drawing/2010/main" val="0"/>
+              </a:ext>
+            </a:extLst>
+          </a:blip>
+          <a:stretch>
+            <a:fillRect/>
+          </a:stretch>
+        </p:blipFill>
+        <p:spPr>
+          <a:xfrm>
+            <a:off x="5875111" y="3453475"/>
+            <a:ext cx="596809" cy="596809"/>
+          </a:xfrm>
+          <a:prstGeom prst="rect">
+            <a:avLst/>
+          </a:prstGeom>
+        </p:spPr>
+      </p:pic>
+    </p:spTree>
+    <p:extLst>
+      <p:ext uri="{BB962C8B-B14F-4D97-AF65-F5344CB8AC3E}">
+        <p14:creationId xmlns:p14="http://schemas.microsoft.com/office/powerpoint/2010/main" val="1852603293"/>
+      </p:ext>
+    </p:extLst>
+  </p:cSld>
+  <p:clrMapOvr>
+    <a:masterClrMapping/>
+  </p:clrMapOvr>
+</p:sld>
+</file>
+
+<file path=ppt/slides/slide2.xml><?xml version="1.0" encoding="utf-8"?>
+<p:sld xmlns:a="http://schemas.openxmlformats.org/drawingml/2006/main" xmlns:r="http://schemas.openxmlformats.org/officeDocument/2006/relationships" xmlns:p="http://schemas.openxmlformats.org/presentationml/2006/main">
+  <p:cSld>
+    <p:spTree>
+      <p:nvGrpSpPr>
+        <p:cNvPr id="1" name=""/>
+        <p:cNvGrpSpPr/>
+        <p:nvPr/>
+      </p:nvGrpSpPr>
+      <p:grpSpPr>
+        <a:xfrm>
+          <a:off x="0" y="0"/>
+          <a:ext cx="0" cy="0"/>
+          <a:chOff x="0" y="0"/>
+          <a:chExt cx="0" cy="0"/>
+        </a:xfrm>
+      </p:grpSpPr>
+      <p:pic>
+        <p:nvPicPr>
+          <p:cNvPr id="5" name="Picture 4">
+            <a:extLst>
+              <a:ext uri="{FF2B5EF4-FFF2-40B4-BE49-F238E27FC236}">
+                <a16:creationId xmlns:a16="http://schemas.microsoft.com/office/drawing/2014/main" id="{C2930EAD-03B5-4C29-8E8E-6393B3F47A5E}"/>
+              </a:ext>
+            </a:extLst>
+          </p:cNvPr>
+          <p:cNvPicPr>
+            <a:picLocks noChangeAspect="1"/>
+          </p:cNvPicPr>
+          <p:nvPr/>
+        </p:nvPicPr>
+        <p:blipFill>
+          <a:blip r:embed="rId2">
+            <a:duotone>
+              <a:schemeClr val="accent6">
+                <a:shade val="45000"/>
+                <a:satMod val="135000"/>
+              </a:schemeClr>
+              <a:prstClr val="white"/>
+            </a:duotone>
+            <a:extLst>
+              <a:ext uri="{28A0092B-C50C-407E-A947-70E740481C1C}">
+                <a14:useLocalDpi xmlns:a14="http://schemas.microsoft.com/office/drawing/2010/main" val="0"/>
+              </a:ext>
+            </a:extLst>
+          </a:blip>
+          <a:stretch>
+            <a:fillRect/>
+          </a:stretch>
+        </p:blipFill>
+        <p:spPr>
+          <a:xfrm>
+            <a:off x="8142334" y="1259395"/>
+            <a:ext cx="3142175" cy="3142175"/>
+          </a:xfrm>
+          <a:prstGeom prst="rect">
+            <a:avLst/>
+          </a:prstGeom>
+        </p:spPr>
+      </p:pic>
+      <p:sp>
+        <p:nvSpPr>
+          <p:cNvPr id="6" name="Isosceles Triangle 5">
+            <a:extLst>
+              <a:ext uri="{FF2B5EF4-FFF2-40B4-BE49-F238E27FC236}">
+                <a16:creationId xmlns:a16="http://schemas.microsoft.com/office/drawing/2014/main" id="{41A78253-C12C-406F-87F4-6D00F292D6CC}"/>
+              </a:ext>
+            </a:extLst>
+          </p:cNvPr>
+          <p:cNvSpPr/>
+          <p:nvPr/>
+        </p:nvSpPr>
+        <p:spPr>
+          <a:xfrm rot="5400000">
+            <a:off x="8142333" y="1259395"/>
+            <a:ext cx="3142175" cy="3142175"/>
+          </a:xfrm>
+          <a:prstGeom prst="triangle">
+            <a:avLst/>
+          </a:prstGeom>
+          <a:ln w="76200">
+            <a:solidFill>
+              <a:schemeClr val="bg1"/>
+            </a:solidFill>
+          </a:ln>
+        </p:spPr>
+        <p:style>
+          <a:lnRef idx="2">
+            <a:schemeClr val="accent6">
+              <a:shade val="50000"/>
+            </a:schemeClr>
+          </a:lnRef>
+          <a:fillRef idx="1">
+            <a:schemeClr val="accent6"/>
+          </a:fillRef>
+          <a:effectRef idx="0">
+            <a:schemeClr val="accent6"/>
+          </a:effectRef>
+          <a:fontRef idx="minor">
+            <a:schemeClr val="lt1"/>
+          </a:fontRef>
+        </p:style>
+        <p:txBody>
+          <a:bodyPr rtlCol="0" anchor="ctr"/>
+          <a:lstStyle/>
+          <a:p>
+            <a:pPr algn="ctr"/>
+            <a:endParaRPr lang="en-PH"/>
+          </a:p>
+        </p:txBody>
+      </p:sp>
+      <p:pic>
+        <p:nvPicPr>
+          <p:cNvPr id="10" name="Picture 9">
+            <a:extLst>
+              <a:ext uri="{FF2B5EF4-FFF2-40B4-BE49-F238E27FC236}">
+                <a16:creationId xmlns:a16="http://schemas.microsoft.com/office/drawing/2014/main" id="{0EB71839-7D87-4A38-B092-E4C4565F733D}"/>
+              </a:ext>
+            </a:extLst>
+          </p:cNvPr>
+          <p:cNvPicPr>
+            <a:picLocks noChangeAspect="1"/>
+          </p:cNvPicPr>
+          <p:nvPr/>
+        </p:nvPicPr>
+        <p:blipFill>
+          <a:blip r:embed="rId3"/>
+          <a:stretch>
+            <a:fillRect/>
+          </a:stretch>
+        </p:blipFill>
+        <p:spPr>
+          <a:xfrm>
+            <a:off x="1578722" y="1121638"/>
+            <a:ext cx="3273836" cy="3279932"/>
+          </a:xfrm>
+          <a:prstGeom prst="rect">
+            <a:avLst/>
+          </a:prstGeom>
+        </p:spPr>
+      </p:pic>
+      <p:grpSp>
+        <p:nvGrpSpPr>
+          <p:cNvPr id="13" name="Group 12">
+            <a:extLst>
+              <a:ext uri="{FF2B5EF4-FFF2-40B4-BE49-F238E27FC236}">
+                <a16:creationId xmlns:a16="http://schemas.microsoft.com/office/drawing/2014/main" id="{7B5ADC70-5DF1-4F9D-B75D-EC36091ACD29}"/>
+              </a:ext>
+            </a:extLst>
+          </p:cNvPr>
+          <p:cNvGrpSpPr/>
+          <p:nvPr/>
+        </p:nvGrpSpPr>
+        <p:grpSpPr>
+          <a:xfrm>
+            <a:off x="5360603" y="3108906"/>
+            <a:ext cx="1832677" cy="1249788"/>
+            <a:chOff x="3935663" y="2484066"/>
+            <a:chExt cx="1832677" cy="1249788"/>
+          </a:xfrm>
+        </p:grpSpPr>
+        <p:pic>
+          <p:nvPicPr>
+            <p:cNvPr id="14" name="Picture 13">
+              <a:extLst>
+                <a:ext uri="{FF2B5EF4-FFF2-40B4-BE49-F238E27FC236}">
+                  <a16:creationId xmlns:a16="http://schemas.microsoft.com/office/drawing/2014/main" id="{21DB4055-3027-4E81-BB51-7353EC14882F}"/>
+                </a:ext>
+              </a:extLst>
+            </p:cNvPr>
+            <p:cNvPicPr>
+              <a:picLocks noChangeAspect="1"/>
+            </p:cNvPicPr>
+            <p:nvPr/>
+          </p:nvPicPr>
+          <p:blipFill>
+            <a:blip r:embed="rId4"/>
+            <a:stretch>
+              <a:fillRect/>
+            </a:stretch>
+          </p:blipFill>
+          <p:spPr>
+            <a:xfrm>
+              <a:off x="3935663" y="2484066"/>
+              <a:ext cx="1531753" cy="1249788"/>
+            </a:xfrm>
+            <a:prstGeom prst="rect">
+              <a:avLst/>
+            </a:prstGeom>
+          </p:spPr>
+        </p:pic>
+        <p:sp>
+          <p:nvSpPr>
+            <p:cNvPr id="15" name="Rectangle: Rounded Corners 14">
+              <a:extLst>
+                <a:ext uri="{FF2B5EF4-FFF2-40B4-BE49-F238E27FC236}">
+                  <a16:creationId xmlns:a16="http://schemas.microsoft.com/office/drawing/2014/main" id="{1DE4BAEB-FC6F-463B-8C26-19694FD657B7}"/>
+                </a:ext>
+              </a:extLst>
+            </p:cNvPr>
+            <p:cNvSpPr/>
+            <p:nvPr/>
+          </p:nvSpPr>
+          <p:spPr>
+            <a:xfrm>
+              <a:off x="4602480" y="3017520"/>
+              <a:ext cx="1165860" cy="411480"/>
+            </a:xfrm>
+            <a:prstGeom prst="roundRect">
+              <a:avLst/>
+            </a:prstGeom>
+            <a:solidFill>
+              <a:srgbClr val="C00000"/>
+            </a:solidFill>
+            <a:ln>
+              <a:solidFill>
+                <a:schemeClr val="bg1"/>
+              </a:solidFill>
+            </a:ln>
+          </p:spPr>
+          <p:style>
+            <a:lnRef idx="2">
+              <a:schemeClr val="accent1">
+                <a:shade val="50000"/>
+              </a:schemeClr>
+            </a:lnRef>
+            <a:fillRef idx="1">
+              <a:schemeClr val="accent1"/>
+            </a:fillRef>
+            <a:effectRef idx="0">
+              <a:schemeClr val="accent1"/>
+            </a:effectRef>
+            <a:fontRef idx="minor">
+              <a:schemeClr val="lt1"/>
+            </a:fontRef>
+          </p:style>
+          <p:txBody>
+            <a:bodyPr rtlCol="0" anchor="ctr"/>
+            <a:lstStyle/>
+            <a:p>
+              <a:pPr algn="ctr"/>
+              <a:endParaRPr lang="en-PH"/>
+            </a:p>
+          </p:txBody>
+        </p:sp>
+      </p:grpSp>
+      <p:grpSp>
+        <p:nvGrpSpPr>
+          <p:cNvPr id="8" name="Group 7">
+            <a:extLst>
+              <a:ext uri="{FF2B5EF4-FFF2-40B4-BE49-F238E27FC236}">
+                <a16:creationId xmlns:a16="http://schemas.microsoft.com/office/drawing/2014/main" id="{050BFF2D-C231-4EFF-8F9C-D84C7793C8CB}"/>
+              </a:ext>
+            </a:extLst>
+          </p:cNvPr>
+          <p:cNvGrpSpPr/>
+          <p:nvPr/>
+        </p:nvGrpSpPr>
+        <p:grpSpPr>
+          <a:xfrm>
+            <a:off x="-481081" y="1667653"/>
+            <a:ext cx="5697780" cy="5467834"/>
+            <a:chOff x="5275020" y="872006"/>
+            <a:chExt cx="5697780" cy="5467834"/>
+          </a:xfrm>
+        </p:grpSpPr>
+        <p:pic>
+          <p:nvPicPr>
+            <p:cNvPr id="9" name="Picture 8">
+              <a:extLst>
+                <a:ext uri="{FF2B5EF4-FFF2-40B4-BE49-F238E27FC236}">
+                  <a16:creationId xmlns:a16="http://schemas.microsoft.com/office/drawing/2014/main" id="{7E31A856-DE8D-43C2-9034-B1F4C1B6A621}"/>
+                </a:ext>
+              </a:extLst>
+            </p:cNvPr>
+            <p:cNvPicPr>
+              <a:picLocks noChangeAspect="1"/>
+            </p:cNvPicPr>
+            <p:nvPr/>
+          </p:nvPicPr>
+          <p:blipFill rotWithShape="1">
+            <a:blip r:embed="rId5">
+              <a:duotone>
+                <a:schemeClr val="bg2">
+                  <a:shade val="45000"/>
+                  <a:satMod val="135000"/>
+                </a:schemeClr>
+                <a:prstClr val="white"/>
+              </a:duotone>
+            </a:blip>
+            <a:srcRect b="26273"/>
+            <a:stretch/>
+          </p:blipFill>
+          <p:spPr>
+            <a:xfrm>
+              <a:off x="5275020" y="872006"/>
+              <a:ext cx="4877223" cy="4876800"/>
+            </a:xfrm>
+            <a:prstGeom prst="rect">
+              <a:avLst/>
+            </a:prstGeom>
+          </p:spPr>
+        </p:pic>
+        <p:sp>
+          <p:nvSpPr>
+            <p:cNvPr id="11" name="Star: 8 Points 10">
+              <a:extLst>
+                <a:ext uri="{FF2B5EF4-FFF2-40B4-BE49-F238E27FC236}">
+                  <a16:creationId xmlns:a16="http://schemas.microsoft.com/office/drawing/2014/main" id="{CD63C7A9-D15B-446D-A540-BBCCD3954117}"/>
+                </a:ext>
+              </a:extLst>
+            </p:cNvPr>
+            <p:cNvSpPr/>
+            <p:nvPr/>
+          </p:nvSpPr>
+          <p:spPr>
+            <a:xfrm>
+              <a:off x="6827520" y="2712720"/>
+              <a:ext cx="4145280" cy="3627120"/>
+            </a:xfrm>
+            <a:prstGeom prst="star8">
+              <a:avLst/>
+            </a:prstGeom>
+            <a:solidFill>
+              <a:schemeClr val="accent1">
+                <a:lumMod val="75000"/>
+              </a:schemeClr>
+            </a:solidFill>
+            <a:ln>
+              <a:noFill/>
+            </a:ln>
+          </p:spPr>
+          <p:style>
+            <a:lnRef idx="2">
+              <a:schemeClr val="accent1">
+                <a:shade val="50000"/>
+              </a:schemeClr>
+            </a:lnRef>
+            <a:fillRef idx="1">
+              <a:schemeClr val="accent1"/>
+            </a:fillRef>
+            <a:effectRef idx="0">
+              <a:schemeClr val="accent1"/>
+            </a:effectRef>
+            <a:fontRef idx="minor">
+              <a:schemeClr val="lt1"/>
+            </a:fontRef>
+          </p:style>
+          <p:txBody>
+            <a:bodyPr rtlCol="0" anchor="ctr"/>
+            <a:lstStyle/>
+            <a:p>
+              <a:pPr algn="ctr"/>
+              <a:r>
+                <a:rPr lang="en-PH" sz="9600" dirty="0"/>
+                <a:t>NEW</a:t>
+              </a:r>
+            </a:p>
+          </p:txBody>
+        </p:sp>
+      </p:grpSp>
+    </p:spTree>
+    <p:extLst>
+      <p:ext uri="{BB962C8B-B14F-4D97-AF65-F5344CB8AC3E}">
+        <p14:creationId xmlns:p14="http://schemas.microsoft.com/office/powerpoint/2010/main" val="418557663"/>
+      </p:ext>
+    </p:extLst>
+  </p:cSld>
+  <p:clrMapOvr>
+    <a:masterClrMapping/>
+  </p:clrMapOvr>
+</p:sld>
+</file>
+
+<file path=ppt/slides/slide3.xml><?xml version="1.0" encoding="utf-8"?>
+<p:sld xmlns:a="http://schemas.openxmlformats.org/drawingml/2006/main" xmlns:r="http://schemas.openxmlformats.org/officeDocument/2006/relationships" xmlns:p="http://schemas.openxmlformats.org/presentationml/2006/main">
+  <p:cSld>
+    <p:spTree>
+      <p:nvGrpSpPr>
+        <p:cNvPr id="1" name=""/>
+        <p:cNvGrpSpPr/>
+        <p:nvPr/>
+      </p:nvGrpSpPr>
+      <p:grpSpPr>
+        <a:xfrm>
+          <a:off x="0" y="0"/>
+          <a:ext cx="0" cy="0"/>
+          <a:chOff x="0" y="0"/>
+          <a:chExt cx="0" cy="0"/>
+        </a:xfrm>
+      </p:grpSpPr>
       <p:grpSp>
         <p:nvGrpSpPr>
           <p:cNvPr id="4" name="Group 3">
@@ -3647,7 +4125,7 @@
 </p:sld>
 </file>
 
-<file path=ppt/slides/slide2.xml><?xml version="1.0" encoding="utf-8"?>
+<file path=ppt/slides/slide4.xml><?xml version="1.0" encoding="utf-8"?>
 <p:sld xmlns:a="http://schemas.openxmlformats.org/drawingml/2006/main" xmlns:r="http://schemas.openxmlformats.org/officeDocument/2006/relationships" xmlns:p="http://schemas.openxmlformats.org/presentationml/2006/main">
   <p:cSld>
     <p:spTree>
@@ -3792,7 +4270,7 @@
 </p:sld>
 </file>
 
-<file path=ppt/slides/slide3.xml><?xml version="1.0" encoding="utf-8"?>
+<file path=ppt/slides/slide5.xml><?xml version="1.0" encoding="utf-8"?>
 <p:sld xmlns:a="http://schemas.openxmlformats.org/drawingml/2006/main" xmlns:r="http://schemas.openxmlformats.org/officeDocument/2006/relationships" xmlns:p="http://schemas.openxmlformats.org/presentationml/2006/main">
   <p:cSld>
     <p:spTree>
@@ -3894,7 +4372,7 @@
 </p:sld>
 </file>
 
-<file path=ppt/slides/slide4.xml><?xml version="1.0" encoding="utf-8"?>
+<file path=ppt/slides/slide6.xml><?xml version="1.0" encoding="utf-8"?>
 <p:sld xmlns:a="http://schemas.openxmlformats.org/drawingml/2006/main" xmlns:r="http://schemas.openxmlformats.org/officeDocument/2006/relationships" xmlns:p="http://schemas.openxmlformats.org/presentationml/2006/main">
   <p:cSld>
     <p:spTree>

</xml_diff>